<commit_message>
Sorry, some parts included Japanese yet.
git-svn-id: https://masu.svn.sourceforge.net/svnroot/masu/trunk@1300 5bdb5694-003a-4164-b60f-8fcef0365520
</commit_message>
<xml_diff>
--- a/main/doc/manual-english.pptx
+++ b/main/doc/manual-english.pptx
@@ -6871,32 +6871,16 @@
               <a:buAutoNum type="arabicPeriod"/>
             </a:pPr>
             <a:r>
-              <a:rPr lang="ja-JP" altLang="en-US" sz="2400" dirty="0" smtClean="0"/>
-              <a:t>解析に必要な情報を</a:t>
-            </a:r>
-            <a:r>
               <a:rPr lang="en-US" altLang="ja-JP" sz="2400" dirty="0" smtClean="0"/>
-              <a:t>Settings</a:t>
-            </a:r>
-            <a:r>
-              <a:rPr lang="ja-JP" altLang="en-US" sz="2400" dirty="0" smtClean="0"/>
-              <a:t>クラスに与える</a:t>
+              <a:t>Give configurations to class “Settings”</a:t>
             </a:r>
             <a:endParaRPr lang="en-US" altLang="ja-JP" sz="2400" dirty="0" smtClean="0"/>
           </a:p>
           <a:p>
             <a:pPr lvl="1"/>
             <a:r>
-              <a:rPr kumimoji="1" lang="ja-JP" altLang="en-US" sz="2000" dirty="0" smtClean="0"/>
-              <a:t>対象言語，対象ソースファイル</a:t>
-            </a:r>
-            <a:r>
-              <a:rPr lang="ja-JP" altLang="en-US" sz="2000" dirty="0" smtClean="0"/>
-              <a:t>，スレッド数</a:t>
-            </a:r>
-            <a:r>
-              <a:rPr kumimoji="1" lang="ja-JP" altLang="en-US" sz="2000" dirty="0" smtClean="0"/>
-              <a:t>など</a:t>
+              <a:rPr kumimoji="1" lang="en-US" altLang="ja-JP" sz="2000" dirty="0" smtClean="0"/>
+              <a:t>Target language, Target source files, Number of threads, ...</a:t>
             </a:r>
             <a:endParaRPr kumimoji="1" lang="en-US" altLang="ja-JP" sz="2000" dirty="0" smtClean="0"/>
           </a:p>
@@ -6910,20 +6894,16 @@
               <a:buAutoNum type="arabicPeriod"/>
             </a:pPr>
             <a:r>
-              <a:rPr lang="en-US" altLang="ja-JP" sz="2400" dirty="0" err="1" smtClean="0"/>
-              <a:t>MetricsTool</a:t>
-            </a:r>
-            <a:r>
-              <a:rPr lang="ja-JP" altLang="en-US" sz="2400" dirty="0" smtClean="0"/>
-              <a:t>クラスに定義されている</a:t>
+              <a:rPr lang="en-US" altLang="ja-JP" sz="2400" dirty="0" smtClean="0"/>
+              <a:t>Analysis target source files by invoking method “</a:t>
             </a:r>
             <a:r>
               <a:rPr lang="en-US" altLang="ja-JP" sz="2400" dirty="0" err="1" smtClean="0"/>
               <a:t>analyzeTargetFiles</a:t>
             </a:r>
             <a:r>
-              <a:rPr lang="ja-JP" altLang="en-US" sz="2400" dirty="0" smtClean="0"/>
-              <a:t>メソッドを呼び出し，対象ソースファイルを解析</a:t>
+              <a:rPr lang="en-US" altLang="ja-JP" sz="2400" dirty="0" smtClean="0"/>
+              <a:t>”, which is defined in class “Metrics Class”</a:t>
             </a:r>
             <a:endParaRPr lang="en-US" altLang="ja-JP" sz="2400" dirty="0" smtClean="0"/>
           </a:p>
@@ -6937,64 +6917,60 @@
               <a:buAutoNum type="arabicPeriod"/>
             </a:pPr>
             <a:r>
-              <a:rPr lang="ja-JP" altLang="en-US" sz="2400" dirty="0" smtClean="0"/>
-              <a:t>解析結果を利用</a:t>
+              <a:rPr lang="en-US" altLang="ja-JP" sz="2400" dirty="0" smtClean="0"/>
+              <a:t>Use the analysis result</a:t>
             </a:r>
             <a:endParaRPr lang="en-US" altLang="ja-JP" sz="2400" dirty="0" smtClean="0"/>
           </a:p>
           <a:p>
             <a:pPr lvl="1"/>
             <a:r>
-              <a:rPr kumimoji="1" lang="en-US" altLang="ja-JP" sz="2000" dirty="0" err="1" smtClean="0"/>
+              <a:rPr kumimoji="1" lang="en-US" altLang="ja-JP" sz="2000" dirty="0" smtClean="0"/>
+              <a:t>You can obtain various </a:t>
+            </a:r>
+            <a:r>
+              <a:rPr lang="en-US" altLang="ja-JP" sz="2000" dirty="0" smtClean="0"/>
+              <a:t>kinds of information from </a:t>
+            </a:r>
+            <a:r>
+              <a:rPr lang="en-US" altLang="ja-JP" sz="2000" dirty="0" err="1" smtClean="0"/>
+              <a:t>ClassInfoManager</a:t>
+            </a:r>
+            <a:r>
+              <a:rPr lang="en-US" altLang="ja-JP" sz="2000" dirty="0" smtClean="0"/>
+              <a:t>, </a:t>
+            </a:r>
+            <a:r>
+              <a:rPr lang="en-US" altLang="ja-JP" sz="2000" dirty="0" err="1" smtClean="0"/>
+              <a:t>MethodInfoManger</a:t>
+            </a:r>
+            <a:r>
+              <a:rPr lang="en-US" altLang="ja-JP" sz="2000" dirty="0" smtClean="0"/>
+              <a:t>, </a:t>
+            </a:r>
+            <a:r>
+              <a:rPr lang="en-US" altLang="ja-JP" sz="2000" dirty="0" err="1" smtClean="0"/>
+              <a:t>FieldInfoManager</a:t>
+            </a:r>
+            <a:r>
+              <a:rPr lang="en-US" altLang="ja-JP" sz="2000" dirty="0" smtClean="0"/>
+              <a:t>, and </a:t>
+            </a:r>
+            <a:r>
+              <a:rPr lang="en-US" altLang="ja-JP" sz="2000" dirty="0" err="1" smtClean="0"/>
+              <a:t>FileInfoManager</a:t>
+            </a:r>
+            <a:r>
+              <a:rPr lang="en-US" altLang="ja-JP" sz="2000" dirty="0" smtClean="0"/>
+              <a:t>, which  are available </a:t>
+            </a:r>
+            <a:r>
+              <a:rPr lang="en-US" altLang="ja-JP" sz="2000" dirty="0" smtClean="0"/>
+              <a:t>on </a:t>
+            </a:r>
+            <a:r>
+              <a:rPr lang="en-US" altLang="ja-JP" sz="2000" dirty="0" err="1" smtClean="0"/>
               <a:t>DataManager</a:t>
-            </a:r>
-            <a:r>
-              <a:rPr lang="ja-JP" altLang="en-US" sz="2000" dirty="0" smtClean="0"/>
-              <a:t>から，</a:t>
-            </a:r>
-            <a:r>
-              <a:rPr lang="en-US" altLang="ja-JP" sz="2000" dirty="0" err="1" smtClean="0"/>
-              <a:t>C</a:t>
-            </a:r>
-            <a:r>
-              <a:rPr kumimoji="1" lang="en-US" altLang="ja-JP" sz="2000" dirty="0" err="1" smtClean="0"/>
-              <a:t>lassInfoManager</a:t>
-            </a:r>
-            <a:r>
-              <a:rPr kumimoji="1" lang="en-US" altLang="ja-JP" sz="2000" dirty="0" smtClean="0"/>
-              <a:t>, </a:t>
-            </a:r>
-            <a:r>
-              <a:rPr kumimoji="1" lang="en-US" altLang="ja-JP" sz="2000" dirty="0" err="1" smtClean="0"/>
-              <a:t>MethodInfoManager</a:t>
-            </a:r>
-            <a:r>
-              <a:rPr kumimoji="1" lang="en-US" altLang="ja-JP" sz="2000" dirty="0" smtClean="0"/>
-              <a:t>, </a:t>
-            </a:r>
-            <a:r>
-              <a:rPr kumimoji="1" lang="en-US" altLang="ja-JP" sz="2000" dirty="0" err="1" smtClean="0"/>
-              <a:t>FieldInfoManager</a:t>
-            </a:r>
-            <a:r>
-              <a:rPr kumimoji="1" lang="en-US" altLang="ja-JP" sz="2000" dirty="0" smtClean="0"/>
-              <a:t>, </a:t>
-            </a:r>
-            <a:r>
-              <a:rPr kumimoji="1" lang="en-US" altLang="ja-JP" sz="2000" dirty="0" err="1" smtClean="0"/>
-              <a:t>FileInfoManager</a:t>
-            </a:r>
-            <a:r>
-              <a:rPr kumimoji="1" lang="ja-JP" altLang="en-US" sz="2000" dirty="0" smtClean="0"/>
-              <a:t>を取得</a:t>
-            </a:r>
-            <a:endParaRPr kumimoji="1" lang="en-US" altLang="ja-JP" sz="2000" dirty="0" smtClean="0"/>
-          </a:p>
-          <a:p>
-            <a:pPr lvl="2"/>
-            <a:r>
-              <a:rPr lang="ja-JP" altLang="en-US" sz="1600" dirty="0" smtClean="0"/>
-              <a:t>各マネージャからさまざまな情報を取ってくることができる</a:t>
             </a:r>
             <a:endParaRPr kumimoji="1" lang="ja-JP" altLang="en-US" sz="1600" dirty="0"/>
           </a:p>
@@ -12006,11 +11982,7 @@
             <a:pPr algn="l"/>
             <a:r>
               <a:rPr lang="en-US" altLang="ja-JP" b="1" dirty="0" smtClean="0"/>
-              <a:t>final </a:t>
-            </a:r>
-            <a:r>
-              <a:rPr lang="en-US" altLang="ja-JP" b="1" dirty="0" smtClean="0"/>
-              <a:t>Class&lt;?&gt; </a:t>
+              <a:t>final Class&lt;?&gt; </a:t>
             </a:r>
             <a:r>
               <a:rPr lang="en-US" altLang="ja-JP" b="1" dirty="0" err="1" smtClean="0"/>
@@ -12094,11 +12066,7 @@
             <a:pPr algn="l"/>
             <a:r>
               <a:rPr lang="en-US" altLang="ja-JP" b="1" dirty="0" smtClean="0"/>
-              <a:t>    public </a:t>
-            </a:r>
-            <a:r>
-              <a:rPr lang="en-US" altLang="ja-JP" b="1" dirty="0" smtClean="0"/>
-              <a:t>String </a:t>
+              <a:t>    public String </a:t>
             </a:r>
             <a:r>
               <a:rPr lang="en-US" altLang="ja-JP" b="1" dirty="0" err="1" smtClean="0"/>
@@ -12127,7 +12095,6 @@
               <a:rPr lang="en-US" altLang="ja-JP" b="1" dirty="0" smtClean="0"/>
               <a:t>";</a:t>
             </a:r>
-            <a:endParaRPr lang="en-US" altLang="ja-JP" b="1" dirty="0" smtClean="0"/>
           </a:p>
           <a:p>
             <a:pPr algn="l"/>
@@ -12135,7 +12102,6 @@
               <a:rPr lang="en-US" altLang="ja-JP" dirty="0" smtClean="0"/>
               <a:t>    }</a:t>
             </a:r>
-            <a:endParaRPr lang="en-US" altLang="ja-JP" dirty="0" smtClean="0"/>
           </a:p>
           <a:p>
             <a:pPr algn="l"/>
@@ -12343,11 +12309,7 @@
             <a:pPr algn="l"/>
             <a:r>
               <a:rPr lang="ja-JP" altLang="en-US" b="1" dirty="0" smtClean="0"/>
-              <a:t> </a:t>
-            </a:r>
-            <a:r>
-              <a:rPr lang="ja-JP" altLang="en-US" b="1" dirty="0" smtClean="0"/>
-              <a:t>   </a:t>
+              <a:t>    </a:t>
             </a:r>
             <a:r>
               <a:rPr lang="en-US" altLang="ja-JP" b="1" dirty="0" smtClean="0"/>
@@ -12366,11 +12328,7 @@
             <a:pPr algn="l"/>
             <a:r>
               <a:rPr lang="en-US" altLang="ja-JP" b="1" dirty="0" smtClean="0"/>
-              <a:t>        public </a:t>
-            </a:r>
-            <a:r>
-              <a:rPr lang="en-US" altLang="ja-JP" b="1" dirty="0" smtClean="0"/>
-              <a:t>void </a:t>
+              <a:t>        public void </a:t>
             </a:r>
             <a:r>
               <a:rPr lang="en-US" altLang="ja-JP" b="1" dirty="0" err="1" smtClean="0"/>
@@ -12432,11 +12390,7 @@
             <a:pPr algn="l"/>
             <a:r>
               <a:rPr lang="en-US" altLang="ja-JP" dirty="0" smtClean="0"/>
-              <a:t>                                        + </a:t>
-            </a:r>
-            <a:r>
-              <a:rPr lang="en-US" altLang="ja-JP" dirty="0" smtClean="0"/>
-              <a:t>" &gt; " + </a:t>
+              <a:t>                                        + " &gt; " + </a:t>
             </a:r>
             <a:r>
               <a:rPr lang="en-US" altLang="ja-JP" dirty="0" err="1" smtClean="0"/>
@@ -12453,7 +12407,6 @@
               <a:rPr lang="en-US" altLang="ja-JP" dirty="0" smtClean="0"/>
               <a:t>        }</a:t>
             </a:r>
-            <a:endParaRPr lang="en-US" altLang="ja-JP" dirty="0" smtClean="0"/>
           </a:p>
           <a:p>
             <a:pPr algn="l"/>
@@ -13224,13 +13177,13 @@
         </p:nvSpPr>
         <p:spPr bwMode="auto">
           <a:xfrm>
-            <a:off x="3929058" y="71414"/>
-            <a:ext cx="5072098" cy="919401"/>
+            <a:off x="3929058" y="214290"/>
+            <a:ext cx="5072098" cy="785818"/>
           </a:xfrm>
           <a:prstGeom prst="wedgeRoundRectCallout">
             <a:avLst>
-              <a:gd name="adj1" fmla="val -46967"/>
-              <a:gd name="adj2" fmla="val 104904"/>
+              <a:gd name="adj1" fmla="val -47916"/>
+              <a:gd name="adj2" fmla="val 131103"/>
               <a:gd name="adj3" fmla="val 16667"/>
             </a:avLst>
           </a:prstGeom>
@@ -13253,7 +13206,7 @@
             <a:prstTxWarp prst="textNoShape">
               <a:avLst/>
             </a:prstTxWarp>
-            <a:spAutoFit/>
+            <a:noAutofit/>
           </a:bodyPr>
           <a:lstStyle/>
           <a:p>
@@ -13274,38 +13227,11 @@
               <a:tabLst/>
             </a:pPr>
             <a:r>
-              <a:rPr lang="en-US" altLang="ja-JP" sz="1600" dirty="0" err="1" smtClean="0">
+              <a:rPr lang="en-US" altLang="ja-JP" sz="1600" dirty="0" smtClean="0">
                 <a:ea typeface="ＭＳ Ｐゴシック" pitchFamily="50" charset="-128"/>
               </a:rPr>
-              <a:t>SourceForge</a:t>
-            </a:r>
-            <a:r>
-              <a:rPr lang="ja-JP" altLang="en-US" sz="1600" dirty="0" err="1" smtClean="0">
-                <a:ea typeface="ＭＳ Ｐゴシック" pitchFamily="50" charset="-128"/>
-              </a:rPr>
-              <a:t>での</a:t>
-            </a:r>
-            <a:r>
-              <a:rPr lang="ja-JP" altLang="en-US" sz="1600" dirty="0" smtClean="0">
-                <a:ea typeface="ＭＳ Ｐゴシック" pitchFamily="50" charset="-128"/>
-              </a:rPr>
-              <a:t>バグ登録がめ</a:t>
-            </a:r>
-            <a:r>
-              <a:rPr lang="ja-JP" altLang="en-US" sz="1600" dirty="0" err="1" smtClean="0">
-                <a:ea typeface="ＭＳ Ｐゴシック" pitchFamily="50" charset="-128"/>
-              </a:rPr>
-              <a:t>んど</a:t>
-            </a:r>
-            <a:r>
-              <a:rPr lang="ja-JP" altLang="en-US" sz="1600" dirty="0" smtClean="0">
-                <a:ea typeface="ＭＳ Ｐゴシック" pitchFamily="50" charset="-128"/>
-              </a:rPr>
-              <a:t>くさい人は，</a:t>
-            </a:r>
-            <a:endParaRPr lang="en-US" altLang="ja-JP" sz="1600" dirty="0" smtClean="0">
-              <a:ea typeface="ＭＳ Ｐゴシック" pitchFamily="50" charset="-128"/>
-            </a:endParaRPr>
+              <a:t>Or send a bug report to </a:t>
+            </a:r>
           </a:p>
           <a:p>
             <a:pPr marL="0" marR="0" indent="0" algn="ctr" defTabSz="914400" rtl="0" eaLnBrk="1" fontAlgn="base" latinLnBrk="0" hangingPunct="1">
@@ -13325,11 +13251,11 @@
               <a:tabLst/>
             </a:pPr>
             <a:r>
-              <a:rPr lang="ja-JP" altLang="en-US" sz="1600" dirty="0" smtClean="0">
+              <a:rPr lang="en-US" altLang="ja-JP" sz="1600" dirty="0" smtClean="0">
                 <a:ea typeface="ＭＳ Ｐゴシック" pitchFamily="50" charset="-128"/>
                 <a:hlinkClick r:id="rId4"/>
               </a:rPr>
-              <a:t>Ｍ</a:t>
+              <a:t>m</a:t>
             </a:r>
             <a:r>
               <a:rPr kumimoji="1" lang="en-US" altLang="ja-JP" sz="1600" b="0" i="0" u="none" strike="noStrike" cap="none" normalizeH="0" baseline="0" dirty="0" smtClean="0">
@@ -13375,12 +13301,6 @@
               <a:buNone/>
               <a:tabLst/>
             </a:pPr>
-            <a:r>
-              <a:rPr lang="ja-JP" altLang="en-US" sz="1600" dirty="0" smtClean="0">
-                <a:ea typeface="ＭＳ Ｐゴシック" pitchFamily="50" charset="-128"/>
-              </a:rPr>
-              <a:t>にバグの内容を書いたメールを送ってください</a:t>
-            </a:r>
             <a:endParaRPr kumimoji="1" lang="ja-JP" altLang="en-US" sz="1600" b="0" i="0" u="none" strike="noStrike" cap="none" normalizeH="0" baseline="0" dirty="0" smtClean="0">
               <a:ln>
                 <a:noFill/>
@@ -13633,11 +13553,7 @@
             </a:r>
             <a:r>
               <a:rPr lang="en-US" altLang="ja-JP" dirty="0" smtClean="0"/>
-              <a:t> </a:t>
-            </a:r>
-            <a:r>
-              <a:rPr lang="en-US" altLang="ja-JP" dirty="0" smtClean="0"/>
-              <a:t>Watanabe</a:t>
+              <a:t> Watanabe</a:t>
             </a:r>
             <a:endParaRPr kumimoji="1" lang="ja-JP" altLang="en-US" dirty="0"/>
           </a:p>

</xml_diff>